<commit_message>
Changes to XML presentation
</commit_message>
<xml_diff>
--- a/Presentation/lesson-06.pptx
+++ b/Presentation/lesson-06.pptx
@@ -5,7 +5,7 @@
     <p:sldMasterId id="2147483648" r:id="rId1"/>
   </p:sldMasterIdLst>
   <p:notesMasterIdLst>
-    <p:notesMasterId r:id="rId22"/>
+    <p:notesMasterId r:id="rId21"/>
   </p:notesMasterIdLst>
   <p:sldIdLst>
     <p:sldId id="257" r:id="rId2"/>
@@ -24,10 +24,9 @@
     <p:sldId id="270" r:id="rId15"/>
     <p:sldId id="260" r:id="rId16"/>
     <p:sldId id="271" r:id="rId17"/>
-    <p:sldId id="272" r:id="rId18"/>
+    <p:sldId id="273" r:id="rId18"/>
     <p:sldId id="274" r:id="rId19"/>
-    <p:sldId id="273" r:id="rId20"/>
-    <p:sldId id="276" r:id="rId21"/>
+    <p:sldId id="276" r:id="rId20"/>
   </p:sldIdLst>
   <p:sldSz cx="9144000" cy="6858000" type="screen4x3"/>
   <p:notesSz cx="6858000" cy="9144000"/>
@@ -211,7 +210,7 @@
           <a:p>
             <a:fld id="{B24A7054-7FFB-49F4-A126-5DF6E687FF53}" type="datetimeFigureOut">
               <a:rPr lang="ru-RU" smtClean="0"/>
-              <a:t>21.08.2012</a:t>
+              <a:t>22.08.2012</a:t>
             </a:fld>
             <a:endParaRPr lang="ru-RU"/>
           </a:p>
@@ -1274,7 +1273,7 @@
           <a:p>
             <a:fld id="{8E6E6A2A-E9D3-4A0D-B04A-ABDD367A1E08}" type="datetimeFigureOut">
               <a:rPr lang="ru-RU" smtClean="0"/>
-              <a:t>21.08.2012</a:t>
+              <a:t>22.08.2012</a:t>
             </a:fld>
             <a:endParaRPr lang="ru-RU"/>
           </a:p>
@@ -2722,7 +2721,7 @@
           <a:p>
             <a:fld id="{AC3D3127-B7C4-45E3-9797-C527EC9FDD78}" type="datetimeFigureOut">
               <a:rPr lang="ru-RU" smtClean="0"/>
-              <a:t>21.08.2012</a:t>
+              <a:t>22.08.2012</a:t>
             </a:fld>
             <a:endParaRPr lang="ru-RU"/>
           </a:p>
@@ -5284,8 +5283,8 @@
           <a:lstStyle/>
           <a:p>
             <a:r>
-              <a:rPr lang="en-US" dirty="0" smtClean="0"/>
-              <a:t>DTD</a:t>
+              <a:rPr lang="ru-RU" dirty="0" smtClean="0"/>
+              <a:t>Способы</a:t>
             </a:r>
             <a:endParaRPr lang="en-US" dirty="0"/>
           </a:p>
@@ -5306,7 +5305,94 @@
           <a:bodyPr/>
           <a:lstStyle/>
           <a:p>
-            <a:endParaRPr lang="en-US"/>
+            <a:r>
+              <a:rPr lang="en-US" dirty="0"/>
+              <a:t>DTD – </a:t>
+            </a:r>
+            <a:r>
+              <a:rPr lang="en-US" dirty="0">
+                <a:solidFill>
+                  <a:srgbClr val="FF0000"/>
+                </a:solidFill>
+              </a:rPr>
+              <a:t>D</a:t>
+            </a:r>
+            <a:r>
+              <a:rPr lang="en-US" dirty="0"/>
+              <a:t>ocument </a:t>
+            </a:r>
+            <a:r>
+              <a:rPr lang="en-US" dirty="0">
+                <a:solidFill>
+                  <a:srgbClr val="FF0000"/>
+                </a:solidFill>
+              </a:rPr>
+              <a:t>T</a:t>
+            </a:r>
+            <a:r>
+              <a:rPr lang="en-US" dirty="0"/>
+              <a:t>ype </a:t>
+            </a:r>
+            <a:r>
+              <a:rPr lang="en-US" dirty="0" smtClean="0">
+                <a:solidFill>
+                  <a:srgbClr val="FF0000"/>
+                </a:solidFill>
+              </a:rPr>
+              <a:t>D</a:t>
+            </a:r>
+            <a:r>
+              <a:rPr lang="en-US" dirty="0" smtClean="0"/>
+              <a:t>efinition</a:t>
+            </a:r>
+            <a:endParaRPr lang="ru-RU" dirty="0" smtClean="0"/>
+          </a:p>
+          <a:p>
+            <a:r>
+              <a:rPr lang="en-US" dirty="0"/>
+              <a:t>XML </a:t>
+            </a:r>
+            <a:r>
+              <a:rPr lang="en-US" dirty="0" smtClean="0"/>
+              <a:t>Schema</a:t>
+            </a:r>
+            <a:r>
+              <a:rPr lang="ru-RU" dirty="0" smtClean="0"/>
+              <a:t> (</a:t>
+            </a:r>
+            <a:r>
+              <a:rPr lang="en-US" dirty="0" smtClean="0"/>
+              <a:t>XSD)</a:t>
+            </a:r>
+          </a:p>
+          <a:p>
+            <a:pPr lvl="1"/>
+            <a:r>
+              <a:rPr lang="en-US" dirty="0">
+                <a:hlinkClick r:id="rId2"/>
+              </a:rPr>
+              <a:t>W3C XML Schema Definition Language (XSD) 1.1 Part 1: Structures</a:t>
+            </a:r>
+            <a:endParaRPr lang="en-US" dirty="0"/>
+          </a:p>
+          <a:p>
+            <a:pPr lvl="1"/>
+            <a:r>
+              <a:rPr lang="en-US" dirty="0">
+                <a:hlinkClick r:id="rId3"/>
+              </a:rPr>
+              <a:t>W3C XML Schema Definition Language (XSD) 1.1 Part 2: </a:t>
+            </a:r>
+            <a:r>
+              <a:rPr lang="en-US" dirty="0" err="1">
+                <a:hlinkClick r:id="rId3"/>
+              </a:rPr>
+              <a:t>Datatypes</a:t>
+            </a:r>
+            <a:endParaRPr lang="en-US" dirty="0"/>
+          </a:p>
+          <a:p>
+            <a:endParaRPr lang="en-US" dirty="0" smtClean="0"/>
           </a:p>
         </p:txBody>
       </p:sp>
@@ -5320,6 +5406,14 @@
   <p:clrMapOvr>
     <a:masterClrMapping/>
   </p:clrMapOvr>
+  <mc:AlternateContent xmlns:mc="http://schemas.openxmlformats.org/markup-compatibility/2006">
+    <mc:Choice xmlns:p14="http://schemas.microsoft.com/office/powerpoint/2010/main" Requires="p14">
+      <p:transition spd="slow" p14:dur="2000"/>
+    </mc:Choice>
+    <mc:Fallback>
+      <p:transition spd="slow"/>
+    </mc:Fallback>
+  </mc:AlternateContent>
 </p:sld>
 </file>
 
@@ -5352,12 +5446,69 @@
         </p:nvSpPr>
         <p:spPr/>
         <p:txBody>
-          <a:bodyPr/>
+          <a:bodyPr>
+            <a:normAutofit fontScale="90000"/>
+          </a:bodyPr>
           <a:lstStyle/>
           <a:p>
             <a:r>
               <a:rPr lang="en-US" dirty="0" smtClean="0"/>
-              <a:t>XML Schema</a:t>
+              <a:t>XSLT - E</a:t>
+            </a:r>
+            <a:r>
+              <a:rPr lang="en-US" dirty="0" smtClean="0">
+                <a:solidFill>
+                  <a:srgbClr val="FF0000"/>
+                </a:solidFill>
+              </a:rPr>
+              <a:t>x</a:t>
+            </a:r>
+            <a:r>
+              <a:rPr lang="en-US" dirty="0" smtClean="0"/>
+              <a:t>tensible </a:t>
+            </a:r>
+            <a:r>
+              <a:rPr lang="en-US" dirty="0" err="1">
+                <a:solidFill>
+                  <a:srgbClr val="FF0000"/>
+                </a:solidFill>
+              </a:rPr>
+              <a:t>S</a:t>
+            </a:r>
+            <a:r>
+              <a:rPr lang="en-US" dirty="0" err="1"/>
+              <a:t>tylesheet</a:t>
+            </a:r>
+            <a:r>
+              <a:rPr lang="en-US" dirty="0"/>
+              <a:t> </a:t>
+            </a:r>
+            <a:r>
+              <a:rPr lang="en-US" dirty="0">
+                <a:solidFill>
+                  <a:srgbClr val="FF0000"/>
+                </a:solidFill>
+              </a:rPr>
+              <a:t>L</a:t>
+            </a:r>
+            <a:r>
+              <a:rPr lang="en-US" dirty="0"/>
+              <a:t>anguage</a:t>
+            </a:r>
+            <a:br>
+              <a:rPr lang="en-US" dirty="0"/>
+            </a:br>
+            <a:r>
+              <a:rPr lang="en-US" dirty="0">
+                <a:solidFill>
+                  <a:srgbClr val="FF0000"/>
+                </a:solidFill>
+              </a:rPr>
+              <a:t>T</a:t>
+            </a:r>
+            <a:r>
+              <a:rPr lang="en-US" dirty="0"/>
+              <a:t>ransformations</a:t>
             </a:r>
             <a:endParaRPr lang="en-US" dirty="0"/>
           </a:p>
@@ -5379,32 +5530,33 @@
           <a:lstStyle/>
           <a:p>
             <a:r>
-              <a:rPr lang="en-US" dirty="0">
-                <a:hlinkClick r:id="rId2"/>
-              </a:rPr>
-              <a:t>W3C XML Schema Definition Language (XSD) 1.1 Part 1: </a:t>
-            </a:r>
-            <a:r>
-              <a:rPr lang="en-US" dirty="0" smtClean="0">
-                <a:hlinkClick r:id="rId2"/>
-              </a:rPr>
-              <a:t>Structures</a:t>
-            </a:r>
-            <a:endParaRPr lang="en-US" dirty="0" smtClean="0"/>
-          </a:p>
-          <a:p>
-            <a:r>
-              <a:rPr lang="en-US" dirty="0">
-                <a:hlinkClick r:id="rId3"/>
-              </a:rPr>
-              <a:t>W3C XML Schema Definition Language (XSD) 1.1 Part 2: </a:t>
-            </a:r>
-            <a:r>
-              <a:rPr lang="en-US" dirty="0" err="1">
-                <a:hlinkClick r:id="rId3"/>
-              </a:rPr>
-              <a:t>Datatypes</a:t>
-            </a:r>
+              <a:rPr lang="ru-RU" dirty="0" smtClean="0"/>
+              <a:t>Позволяет производить трансформации одного документа в другой</a:t>
+            </a:r>
+            <a:r>
+              <a:rPr lang="en-US" dirty="0" smtClean="0"/>
+              <a:t>, </a:t>
+            </a:r>
+            <a:r>
+              <a:rPr lang="ru-RU" dirty="0"/>
+              <a:t>а </a:t>
+            </a:r>
+            <a:r>
+              <a:rPr lang="ru-RU" dirty="0" smtClean="0"/>
+              <a:t>также в другие форматы.</a:t>
+            </a:r>
+          </a:p>
+          <a:p>
+            <a:r>
+              <a:rPr lang="ru-RU" dirty="0" smtClean="0"/>
+              <a:t>Основан на </a:t>
+            </a:r>
+            <a:r>
+              <a:rPr lang="en-US" dirty="0" smtClean="0"/>
+              <a:t>XML</a:t>
+            </a:r>
+          </a:p>
+          <a:p>
             <a:endParaRPr lang="en-US" dirty="0"/>
           </a:p>
         </p:txBody>
@@ -5412,7 +5564,7 @@
     </p:spTree>
     <p:extLst>
       <p:ext uri="{BB962C8B-B14F-4D97-AF65-F5344CB8AC3E}">
-        <p14:creationId xmlns:p14="http://schemas.microsoft.com/office/powerpoint/2010/main" val="2075942463"/>
+        <p14:creationId xmlns:p14="http://schemas.microsoft.com/office/powerpoint/2010/main" val="103880850"/>
       </p:ext>
     </p:extLst>
   </p:cSld>
@@ -5567,9 +5719,9 @@
           <a:p>
             <a:r>
               <a:rPr lang="en-US" dirty="0" smtClean="0"/>
-              <a:t>XSLT</a:t>
-            </a:r>
-            <a:endParaRPr lang="en-US" dirty="0"/>
+              <a:t>DOM &amp; SAX</a:t>
+            </a:r>
+            <a:endParaRPr lang="ru-RU" dirty="0"/>
           </a:p>
         </p:txBody>
       </p:sp>
@@ -5588,14 +5740,114 @@
           <a:bodyPr/>
           <a:lstStyle/>
           <a:p>
-            <a:endParaRPr lang="en-US"/>
+            <a:r>
+              <a:rPr lang="en-US" dirty="0" smtClean="0"/>
+              <a:t>DOM – </a:t>
+            </a:r>
+            <a:r>
+              <a:rPr lang="en-US" dirty="0" smtClean="0">
+                <a:solidFill>
+                  <a:srgbClr val="FF0000"/>
+                </a:solidFill>
+              </a:rPr>
+              <a:t>D</a:t>
+            </a:r>
+            <a:r>
+              <a:rPr lang="en-US" dirty="0" smtClean="0"/>
+              <a:t>ocument </a:t>
+            </a:r>
+            <a:r>
+              <a:rPr lang="en-US" dirty="0" smtClean="0">
+                <a:solidFill>
+                  <a:srgbClr val="FF0000"/>
+                </a:solidFill>
+              </a:rPr>
+              <a:t>O</a:t>
+            </a:r>
+            <a:r>
+              <a:rPr lang="en-US" dirty="0" smtClean="0"/>
+              <a:t>bject </a:t>
+            </a:r>
+            <a:r>
+              <a:rPr lang="en-US" dirty="0" smtClean="0">
+                <a:solidFill>
+                  <a:srgbClr val="FF0000"/>
+                </a:solidFill>
+              </a:rPr>
+              <a:t>M</a:t>
+            </a:r>
+            <a:r>
+              <a:rPr lang="en-US" dirty="0" smtClean="0"/>
+              <a:t>odel</a:t>
+            </a:r>
+          </a:p>
+          <a:p>
+            <a:pPr lvl="1"/>
+            <a:r>
+              <a:rPr lang="en-US" dirty="0" err="1" smtClean="0"/>
+              <a:t>XmlDocument</a:t>
+            </a:r>
+            <a:r>
+              <a:rPr lang="en-US" dirty="0" smtClean="0"/>
+              <a:t> class</a:t>
+            </a:r>
+          </a:p>
+          <a:p>
+            <a:r>
+              <a:rPr lang="en-US" dirty="0" smtClean="0"/>
+              <a:t>SAX – </a:t>
+            </a:r>
+            <a:r>
+              <a:rPr lang="en-US" dirty="0" smtClean="0">
+                <a:solidFill>
+                  <a:srgbClr val="FF0000"/>
+                </a:solidFill>
+              </a:rPr>
+              <a:t>S</a:t>
+            </a:r>
+            <a:r>
+              <a:rPr lang="en-US" dirty="0" smtClean="0"/>
+              <a:t>imple </a:t>
+            </a:r>
+            <a:r>
+              <a:rPr lang="en-US" dirty="0" smtClean="0">
+                <a:solidFill>
+                  <a:srgbClr val="FF0000"/>
+                </a:solidFill>
+              </a:rPr>
+              <a:t>A</a:t>
+            </a:r>
+            <a:r>
+              <a:rPr lang="en-US" dirty="0" smtClean="0"/>
+              <a:t>PI for </a:t>
+            </a:r>
+            <a:r>
+              <a:rPr lang="en-US" dirty="0" smtClean="0">
+                <a:solidFill>
+                  <a:srgbClr val="FF0000"/>
+                </a:solidFill>
+              </a:rPr>
+              <a:t>X</a:t>
+            </a:r>
+            <a:r>
+              <a:rPr lang="en-US" dirty="0" smtClean="0"/>
+              <a:t>ML</a:t>
+            </a:r>
+          </a:p>
+          <a:p>
+            <a:pPr lvl="1"/>
+            <a:r>
+              <a:rPr lang="en-US" dirty="0" err="1" smtClean="0"/>
+              <a:t>XmlReader</a:t>
+            </a:r>
+            <a:endParaRPr lang="ru-RU" dirty="0"/>
           </a:p>
         </p:txBody>
       </p:sp>
     </p:spTree>
     <p:extLst>
       <p:ext uri="{BB962C8B-B14F-4D97-AF65-F5344CB8AC3E}">
-        <p14:creationId xmlns:p14="http://schemas.microsoft.com/office/powerpoint/2010/main" val="103880850"/>
+        <p14:creationId xmlns:p14="http://schemas.microsoft.com/office/powerpoint/2010/main" val="786506698"/>
       </p:ext>
     </p:extLst>
   </p:cSld>
@@ -5716,178 +5968,6 @@
     <p:extLst>
       <p:ext uri="{BB962C8B-B14F-4D97-AF65-F5344CB8AC3E}">
         <p14:creationId xmlns:p14="http://schemas.microsoft.com/office/powerpoint/2010/main" val="1810951574"/>
-      </p:ext>
-    </p:extLst>
-  </p:cSld>
-  <p:clrMapOvr>
-    <a:masterClrMapping/>
-  </p:clrMapOvr>
-</p:sld>
-</file>
-
-<file path=ppt/slides/slide20.xml><?xml version="1.0" encoding="utf-8"?>
-<p:sld xmlns:a="http://schemas.openxmlformats.org/drawingml/2006/main" xmlns:r="http://schemas.openxmlformats.org/officeDocument/2006/relationships" xmlns:p="http://schemas.openxmlformats.org/presentationml/2006/main">
-  <p:cSld>
-    <p:spTree>
-      <p:nvGrpSpPr>
-        <p:cNvPr id="1" name=""/>
-        <p:cNvGrpSpPr/>
-        <p:nvPr/>
-      </p:nvGrpSpPr>
-      <p:grpSpPr>
-        <a:xfrm>
-          <a:off x="0" y="0"/>
-          <a:ext cx="0" cy="0"/>
-          <a:chOff x="0" y="0"/>
-          <a:chExt cx="0" cy="0"/>
-        </a:xfrm>
-      </p:grpSpPr>
-      <p:sp>
-        <p:nvSpPr>
-          <p:cNvPr id="2" name="Title 1"/>
-          <p:cNvSpPr>
-            <a:spLocks noGrp="1"/>
-          </p:cNvSpPr>
-          <p:nvPr>
-            <p:ph type="title"/>
-          </p:nvPr>
-        </p:nvSpPr>
-        <p:spPr/>
-        <p:txBody>
-          <a:bodyPr/>
-          <a:lstStyle/>
-          <a:p>
-            <a:r>
-              <a:rPr lang="en-US" dirty="0" smtClean="0"/>
-              <a:t>DOM &amp; SAX</a:t>
-            </a:r>
-            <a:endParaRPr lang="ru-RU" dirty="0"/>
-          </a:p>
-        </p:txBody>
-      </p:sp>
-      <p:sp>
-        <p:nvSpPr>
-          <p:cNvPr id="3" name="Content Placeholder 2"/>
-          <p:cNvSpPr>
-            <a:spLocks noGrp="1"/>
-          </p:cNvSpPr>
-          <p:nvPr>
-            <p:ph idx="1"/>
-          </p:nvPr>
-        </p:nvSpPr>
-        <p:spPr/>
-        <p:txBody>
-          <a:bodyPr/>
-          <a:lstStyle/>
-          <a:p>
-            <a:r>
-              <a:rPr lang="en-US" dirty="0" smtClean="0"/>
-              <a:t>DOM – </a:t>
-            </a:r>
-            <a:r>
-              <a:rPr lang="en-US" dirty="0" smtClean="0">
-                <a:solidFill>
-                  <a:srgbClr val="FF0000"/>
-                </a:solidFill>
-              </a:rPr>
-              <a:t>D</a:t>
-            </a:r>
-            <a:r>
-              <a:rPr lang="en-US" dirty="0" smtClean="0"/>
-              <a:t>ocument </a:t>
-            </a:r>
-            <a:r>
-              <a:rPr lang="en-US" dirty="0" smtClean="0">
-                <a:solidFill>
-                  <a:srgbClr val="FF0000"/>
-                </a:solidFill>
-              </a:rPr>
-              <a:t>O</a:t>
-            </a:r>
-            <a:r>
-              <a:rPr lang="en-US" dirty="0" smtClean="0"/>
-              <a:t>bject </a:t>
-            </a:r>
-            <a:r>
-              <a:rPr lang="en-US" dirty="0" smtClean="0">
-                <a:solidFill>
-                  <a:srgbClr val="FF0000"/>
-                </a:solidFill>
-              </a:rPr>
-              <a:t>M</a:t>
-            </a:r>
-            <a:r>
-              <a:rPr lang="en-US" dirty="0" smtClean="0"/>
-              <a:t>odel</a:t>
-            </a:r>
-          </a:p>
-          <a:p>
-            <a:pPr lvl="1"/>
-            <a:r>
-              <a:rPr lang="en-US" dirty="0" err="1" smtClean="0"/>
-              <a:t>XmlDocument</a:t>
-            </a:r>
-            <a:r>
-              <a:rPr lang="en-US" dirty="0" smtClean="0"/>
-              <a:t> class</a:t>
-            </a:r>
-          </a:p>
-          <a:p>
-            <a:r>
-              <a:rPr lang="en-US" dirty="0" smtClean="0"/>
-              <a:t>SAX – </a:t>
-            </a:r>
-            <a:r>
-              <a:rPr lang="en-US" dirty="0" smtClean="0">
-                <a:solidFill>
-                  <a:srgbClr val="FF0000"/>
-                </a:solidFill>
-              </a:rPr>
-              <a:t>S</a:t>
-            </a:r>
-            <a:r>
-              <a:rPr lang="en-US" dirty="0" smtClean="0"/>
-              <a:t>imple </a:t>
-            </a:r>
-            <a:r>
-              <a:rPr lang="en-US" dirty="0" smtClean="0">
-                <a:solidFill>
-                  <a:srgbClr val="FF0000"/>
-                </a:solidFill>
-              </a:rPr>
-              <a:t>A</a:t>
-            </a:r>
-            <a:r>
-              <a:rPr lang="en-US" dirty="0" smtClean="0"/>
-              <a:t>PI for </a:t>
-            </a:r>
-            <a:r>
-              <a:rPr lang="en-US" dirty="0" smtClean="0">
-                <a:solidFill>
-                  <a:srgbClr val="FF0000"/>
-                </a:solidFill>
-              </a:rPr>
-              <a:t>X</a:t>
-            </a:r>
-            <a:r>
-              <a:rPr lang="en-US" dirty="0" smtClean="0"/>
-              <a:t>ML</a:t>
-            </a:r>
-          </a:p>
-          <a:p>
-            <a:pPr lvl="1"/>
-            <a:r>
-              <a:rPr lang="en-US" dirty="0" err="1" smtClean="0"/>
-              <a:t>XmlReader</a:t>
-            </a:r>
-            <a:endParaRPr lang="ru-RU" dirty="0"/>
-          </a:p>
-        </p:txBody>
-      </p:sp>
-    </p:spTree>
-    <p:extLst>
-      <p:ext uri="{BB962C8B-B14F-4D97-AF65-F5344CB8AC3E}">
-        <p14:creationId xmlns:p14="http://schemas.microsoft.com/office/powerpoint/2010/main" val="786506698"/>
       </p:ext>
     </p:extLst>
   </p:cSld>

</xml_diff>